<commit_message>
Add new images and update website content
This commit introduces several new images to the project and updates the website's HTML and CSS files to reflect these changes. Specifically, new background images (back5.png, back6.jpg, and back6.png) and an updated favicon (id_shallow.png) have been added. The PowerPoint file (temp.pptx) has also been updated.

In the HTML file, the favicon link has been updated to use the new id_shallow.png image. Additionally, various formatting and text adjustments have been made to improve readability and presentation, such as adjusting the layout of the "Certificates" section and fixing typographical errors (e.g., "Hugging Face" to "Hugging-Face").

The CSS file has been updated to use one of the new background images (back6.png) for a section of the website, enhancing the visual appeal.

These changes collectively aim to refresh the website's look and feel while ensuring the content is presented clearly and professionally.
</commit_message>
<xml_diff>
--- a/images/temp.pptx
+++ b/images/temp.pptx
@@ -260,7 +260,7 @@
           <a:p>
             <a:fld id="{8A754103-0C04-4ED3-AAAA-7A493AA2E0B6}" type="datetimeFigureOut">
               <a:rPr lang="en-US" smtClean="0"/>
-              <a:t>2/7/2024</a:t>
+              <a:t>3/30/2024</a:t>
             </a:fld>
             <a:endParaRPr lang="en-US"/>
           </a:p>
@@ -458,7 +458,7 @@
           <a:p>
             <a:fld id="{8A754103-0C04-4ED3-AAAA-7A493AA2E0B6}" type="datetimeFigureOut">
               <a:rPr lang="en-US" smtClean="0"/>
-              <a:t>2/7/2024</a:t>
+              <a:t>3/30/2024</a:t>
             </a:fld>
             <a:endParaRPr lang="en-US"/>
           </a:p>
@@ -666,7 +666,7 @@
           <a:p>
             <a:fld id="{8A754103-0C04-4ED3-AAAA-7A493AA2E0B6}" type="datetimeFigureOut">
               <a:rPr lang="en-US" smtClean="0"/>
-              <a:t>2/7/2024</a:t>
+              <a:t>3/30/2024</a:t>
             </a:fld>
             <a:endParaRPr lang="en-US"/>
           </a:p>
@@ -864,7 +864,7 @@
           <a:p>
             <a:fld id="{8A754103-0C04-4ED3-AAAA-7A493AA2E0B6}" type="datetimeFigureOut">
               <a:rPr lang="en-US" smtClean="0"/>
-              <a:t>2/7/2024</a:t>
+              <a:t>3/30/2024</a:t>
             </a:fld>
             <a:endParaRPr lang="en-US"/>
           </a:p>
@@ -1139,7 +1139,7 @@
           <a:p>
             <a:fld id="{8A754103-0C04-4ED3-AAAA-7A493AA2E0B6}" type="datetimeFigureOut">
               <a:rPr lang="en-US" smtClean="0"/>
-              <a:t>2/7/2024</a:t>
+              <a:t>3/30/2024</a:t>
             </a:fld>
             <a:endParaRPr lang="en-US"/>
           </a:p>
@@ -1404,7 +1404,7 @@
           <a:p>
             <a:fld id="{8A754103-0C04-4ED3-AAAA-7A493AA2E0B6}" type="datetimeFigureOut">
               <a:rPr lang="en-US" smtClean="0"/>
-              <a:t>2/7/2024</a:t>
+              <a:t>3/30/2024</a:t>
             </a:fld>
             <a:endParaRPr lang="en-US"/>
           </a:p>
@@ -1816,7 +1816,7 @@
           <a:p>
             <a:fld id="{8A754103-0C04-4ED3-AAAA-7A493AA2E0B6}" type="datetimeFigureOut">
               <a:rPr lang="en-US" smtClean="0"/>
-              <a:t>2/7/2024</a:t>
+              <a:t>3/30/2024</a:t>
             </a:fld>
             <a:endParaRPr lang="en-US"/>
           </a:p>
@@ -1957,7 +1957,7 @@
           <a:p>
             <a:fld id="{8A754103-0C04-4ED3-AAAA-7A493AA2E0B6}" type="datetimeFigureOut">
               <a:rPr lang="en-US" smtClean="0"/>
-              <a:t>2/7/2024</a:t>
+              <a:t>3/30/2024</a:t>
             </a:fld>
             <a:endParaRPr lang="en-US"/>
           </a:p>
@@ -2070,7 +2070,7 @@
           <a:p>
             <a:fld id="{8A754103-0C04-4ED3-AAAA-7A493AA2E0B6}" type="datetimeFigureOut">
               <a:rPr lang="en-US" smtClean="0"/>
-              <a:t>2/7/2024</a:t>
+              <a:t>3/30/2024</a:t>
             </a:fld>
             <a:endParaRPr lang="en-US"/>
           </a:p>
@@ -2381,7 +2381,7 @@
           <a:p>
             <a:fld id="{8A754103-0C04-4ED3-AAAA-7A493AA2E0B6}" type="datetimeFigureOut">
               <a:rPr lang="en-US" smtClean="0"/>
-              <a:t>2/7/2024</a:t>
+              <a:t>3/30/2024</a:t>
             </a:fld>
             <a:endParaRPr lang="en-US"/>
           </a:p>
@@ -2669,7 +2669,7 @@
           <a:p>
             <a:fld id="{8A754103-0C04-4ED3-AAAA-7A493AA2E0B6}" type="datetimeFigureOut">
               <a:rPr lang="en-US" smtClean="0"/>
-              <a:t>2/7/2024</a:t>
+              <a:t>3/30/2024</a:t>
             </a:fld>
             <a:endParaRPr lang="en-US"/>
           </a:p>
@@ -2910,7 +2910,7 @@
           <a:p>
             <a:fld id="{8A754103-0C04-4ED3-AAAA-7A493AA2E0B6}" type="datetimeFigureOut">
               <a:rPr lang="en-US" smtClean="0"/>
-              <a:t>2/7/2024</a:t>
+              <a:t>3/30/2024</a:t>
             </a:fld>
             <a:endParaRPr lang="en-US"/>
           </a:p>
@@ -3432,12 +3432,28 @@
         </p:blipFill>
         <p:spPr>
           <a:xfrm>
-            <a:off x="7300667" y="1539238"/>
-            <a:ext cx="3025499" cy="4166471"/>
+            <a:off x="7554456" y="1841660"/>
+            <a:ext cx="2305305" cy="3174679"/>
           </a:xfrm>
-          <a:prstGeom prst="rect">
-            <a:avLst/>
+          <a:prstGeom prst="round2DiagRect">
+            <a:avLst>
+              <a:gd name="adj1" fmla="val 16667"/>
+              <a:gd name="adj2" fmla="val 0"/>
+            </a:avLst>
           </a:prstGeom>
+          <a:ln w="88900" cap="sq">
+            <a:solidFill>
+              <a:srgbClr val="FFFFFF"/>
+            </a:solidFill>
+            <a:miter lim="800000"/>
+          </a:ln>
+          <a:effectLst>
+            <a:outerShdw blurRad="254000" algn="tl" rotWithShape="0">
+              <a:srgbClr val="000000">
+                <a:alpha val="43000"/>
+              </a:srgbClr>
+            </a:outerShdw>
+          </a:effectLst>
         </p:spPr>
       </p:pic>
     </p:spTree>

</xml_diff>